<commit_message>
Updated Powerpoint, Updated about page
</commit_message>
<xml_diff>
--- a/Senate_Salamanders_Slide.pptx
+++ b/Senate_Salamanders_Slide.pptx
@@ -11,8 +11,8 @@
     <p:sldId id="259" r:id="rId5"/>
     <p:sldId id="260" r:id="rId6"/>
     <p:sldId id="261" r:id="rId7"/>
-    <p:sldId id="262" r:id="rId8"/>
-    <p:sldId id="263" r:id="rId9"/>
+    <p:sldId id="263" r:id="rId8"/>
+    <p:sldId id="264" r:id="rId9"/>
   </p:sldIdLst>
   <p:sldSz cx="12192000" cy="6858000"/>
   <p:notesSz cx="6858000" cy="9144000"/>
@@ -12680,7 +12680,7 @@
                   <a:srgbClr val="C00000"/>
                 </a:solidFill>
               </a:rPr>
-              <a:t>Why do we need Senate Reform?</a:t>
+              <a:t>Why we need Senate Reform</a:t>
             </a:r>
           </a:p>
         </p:txBody>
@@ -12867,16 +12867,23 @@
           </a:xfrm>
         </p:spPr>
         <p:txBody>
-          <a:bodyPr vert="horz"/>
+          <a:bodyPr vert="horz">
+            <a:normAutofit/>
+          </a:bodyPr>
           <a:lstStyle/>
           <a:p>
-            <a:r>
-              <a:rPr lang="en-US" dirty="0">
+            <a:pPr>
+              <a:lnSpc>
+                <a:spcPct val="100000"/>
+              </a:lnSpc>
+            </a:pPr>
+            <a:r>
+              <a:rPr lang="en-US" sz="2800" dirty="0">
                 <a:solidFill>
                   <a:srgbClr val="C00000"/>
                 </a:solidFill>
               </a:rPr>
-              <a:t>What is senate reform?</a:t>
+              <a:t>what are some senate reform proposals?</a:t>
             </a:r>
           </a:p>
         </p:txBody>
@@ -13417,8 +13424,11 @@
             </a:r>
           </a:p>
           <a:p>
-            <a:pPr algn="ctr"/>
-            <a:endParaRPr lang="en-US" dirty="0"/>
+            <a:endParaRPr lang="en-US" sz="1400" dirty="0">
+              <a:solidFill>
+                <a:schemeClr val="bg1"/>
+              </a:solidFill>
+            </a:endParaRPr>
           </a:p>
         </p:txBody>
       </p:sp>
@@ -13856,7 +13866,7 @@
                   <a:srgbClr val="C00000"/>
                 </a:solidFill>
               </a:rPr>
-              <a:t>Coding approach</a:t>
+              <a:t>The coding</a:t>
             </a:r>
           </a:p>
         </p:txBody>
@@ -13877,39 +13887,150 @@
             <p:ph idx="1"/>
           </p:nvPr>
         </p:nvSpPr>
+        <p:spPr>
+          <a:xfrm>
+            <a:off x="6125166" y="948266"/>
+            <a:ext cx="4920129" cy="4961467"/>
+          </a:xfrm>
+        </p:spPr>
+        <p:txBody>
+          <a:bodyPr anchor="b" anchorCtr="0"/>
+          <a:lstStyle/>
+          <a:p>
+            <a:r>
+              <a:rPr lang="en-US" dirty="0"/>
+              <a:t>Cleaning the data:</a:t>
+            </a:r>
+          </a:p>
+          <a:p>
+            <a:pPr lvl="1"/>
+            <a:r>
+              <a:rPr lang="en-US" dirty="0"/>
+              <a:t>Jupyter Notebook</a:t>
+            </a:r>
+          </a:p>
+          <a:p>
+            <a:pPr lvl="1"/>
+            <a:r>
+              <a:rPr lang="en-US" dirty="0"/>
+              <a:t>Used Postgres to create SQL database</a:t>
+            </a:r>
+          </a:p>
+          <a:p>
+            <a:pPr lvl="1"/>
+            <a:r>
+              <a:rPr lang="en-US" dirty="0"/>
+              <a:t>Moved into Flask - SQLite</a:t>
+            </a:r>
+          </a:p>
+          <a:p>
+            <a:r>
+              <a:rPr lang="en-US" dirty="0"/>
+              <a:t>Using the data:</a:t>
+            </a:r>
+          </a:p>
+          <a:p>
+            <a:pPr lvl="1"/>
+            <a:r>
+              <a:rPr lang="en-US" dirty="0"/>
+              <a:t>app.py returned jsons</a:t>
+            </a:r>
+          </a:p>
+          <a:p>
+            <a:pPr lvl="1"/>
+            <a:r>
+              <a:rPr lang="en-US" dirty="0"/>
+              <a:t>Plotly Plots</a:t>
+            </a:r>
+          </a:p>
+          <a:p>
+            <a:pPr lvl="1"/>
+            <a:r>
+              <a:rPr lang="en-US" dirty="0"/>
+              <a:t>d3</a:t>
+            </a:r>
+          </a:p>
+          <a:p>
+            <a:pPr lvl="1"/>
+            <a:r>
+              <a:rPr lang="en-US" dirty="0"/>
+              <a:t>Chamber Plot Structure</a:t>
+            </a:r>
+          </a:p>
+          <a:p>
+            <a:pPr lvl="1"/>
+            <a:endParaRPr lang="en-US" dirty="0"/>
+          </a:p>
+        </p:txBody>
+      </p:sp>
+      <p:sp>
+        <p:nvSpPr>
+          <p:cNvPr id="4" name="Text Placeholder 3">
+            <a:extLst>
+              <a:ext uri="{FF2B5EF4-FFF2-40B4-BE49-F238E27FC236}">
+                <a16:creationId xmlns:a16="http://schemas.microsoft.com/office/drawing/2014/main" id="{34EFEC5C-C092-5942-99D2-D53CA1D04561}"/>
+              </a:ext>
+            </a:extLst>
+          </p:cNvPr>
+          <p:cNvSpPr>
+            <a:spLocks noGrp="1"/>
+          </p:cNvSpPr>
+          <p:nvPr>
+            <p:ph type="body" sz="half" idx="2"/>
+          </p:nvPr>
+        </p:nvSpPr>
         <p:spPr/>
         <p:txBody>
           <a:bodyPr/>
           <a:lstStyle/>
           <a:p>
+            <a:pPr algn="ctr"/>
+            <a:endParaRPr lang="en-US" dirty="0"/>
+          </a:p>
+          <a:p>
+            <a:pPr algn="ctr"/>
             <a:r>
               <a:rPr lang="en-US" dirty="0"/>
               <a:t>Python Flask-powered API</a:t>
             </a:r>
           </a:p>
           <a:p>
+            <a:pPr algn="ctr"/>
             <a:r>
               <a:rPr lang="en-US" dirty="0"/>
               <a:t>HTML/CSS</a:t>
             </a:r>
           </a:p>
           <a:p>
+            <a:pPr algn="ctr"/>
             <a:r>
               <a:rPr lang="en-US" dirty="0"/>
               <a:t>JavaScript</a:t>
             </a:r>
           </a:p>
           <a:p>
+            <a:pPr algn="ctr"/>
             <a:r>
               <a:rPr lang="en-US" dirty="0"/>
               <a:t>Plotly</a:t>
             </a:r>
           </a:p>
           <a:p>
+            <a:pPr algn="ctr"/>
             <a:r>
               <a:rPr lang="en-US" dirty="0"/>
               <a:t>SQLite</a:t>
             </a:r>
+          </a:p>
+          <a:p>
+            <a:pPr algn="ctr"/>
+            <a:r>
+              <a:rPr lang="en-US" dirty="0"/>
+              <a:t>d3</a:t>
+            </a:r>
+          </a:p>
+          <a:p>
+            <a:endParaRPr lang="en-US" dirty="0"/>
           </a:p>
         </p:txBody>
       </p:sp>
@@ -13964,19 +14085,24 @@
           <a:bodyPr/>
           <a:lstStyle/>
           <a:p>
-            <a:r>
-              <a:rPr lang="en-US" dirty="0"/>
-              <a:t>More information from kosal/isabelle on data munging?</a:t>
+            <a:pPr algn="ctr"/>
+            <a:r>
+              <a:rPr lang="en-US" dirty="0">
+                <a:solidFill>
+                  <a:srgbClr val="C00000"/>
+                </a:solidFill>
+              </a:rPr>
+              <a:t>Our dashboard</a:t>
             </a:r>
           </a:p>
         </p:txBody>
       </p:sp>
       <p:sp>
         <p:nvSpPr>
-          <p:cNvPr id="3" name="Content Placeholder 2">
+          <p:cNvPr id="4" name="Content Placeholder 3">
             <a:extLst>
               <a:ext uri="{FF2B5EF4-FFF2-40B4-BE49-F238E27FC236}">
-                <a16:creationId xmlns:a16="http://schemas.microsoft.com/office/drawing/2014/main" id="{72D49549-0F94-204B-B5A0-AB023AA978A1}"/>
+                <a16:creationId xmlns:a16="http://schemas.microsoft.com/office/drawing/2014/main" id="{BE28545C-1BCF-614F-976B-837E901B6577}"/>
               </a:ext>
             </a:extLst>
           </p:cNvPr>
@@ -13984,7 +14110,7 @@
             <a:spLocks noGrp="1"/>
           </p:cNvSpPr>
           <p:nvPr>
-            <p:ph idx="1"/>
+            <p:ph sz="half" idx="1"/>
           </p:nvPr>
         </p:nvSpPr>
         <p:spPr/>
@@ -13992,14 +14118,69 @@
           <a:bodyPr/>
           <a:lstStyle/>
           <a:p>
-            <a:endParaRPr lang="en-US"/>
+            <a:pPr marL="0" indent="0">
+              <a:buNone/>
+            </a:pPr>
+            <a:r>
+              <a:rPr lang="en-US" dirty="0"/>
+              <a:t>Main Page</a:t>
+            </a:r>
+          </a:p>
+          <a:p>
+            <a:pPr marL="0" indent="0">
+              <a:buNone/>
+            </a:pPr>
+            <a:r>
+              <a:rPr lang="en-US" dirty="0"/>
+              <a:t>(add screenshot?)</a:t>
+            </a:r>
+          </a:p>
+        </p:txBody>
+      </p:sp>
+      <p:sp>
+        <p:nvSpPr>
+          <p:cNvPr id="5" name="Content Placeholder 4">
+            <a:extLst>
+              <a:ext uri="{FF2B5EF4-FFF2-40B4-BE49-F238E27FC236}">
+                <a16:creationId xmlns:a16="http://schemas.microsoft.com/office/drawing/2014/main" id="{5CD46765-8349-B640-A4E0-121737C5242B}"/>
+              </a:ext>
+            </a:extLst>
+          </p:cNvPr>
+          <p:cNvSpPr>
+            <a:spLocks noGrp="1"/>
+          </p:cNvSpPr>
+          <p:nvPr>
+            <p:ph sz="half" idx="2"/>
+          </p:nvPr>
+        </p:nvSpPr>
+        <p:spPr/>
+        <p:txBody>
+          <a:bodyPr/>
+          <a:lstStyle/>
+          <a:p>
+            <a:pPr marL="0" indent="0">
+              <a:buNone/>
+            </a:pPr>
+            <a:r>
+              <a:rPr lang="en-US" dirty="0"/>
+              <a:t>About page</a:t>
+            </a:r>
+          </a:p>
+          <a:p>
+            <a:pPr marL="0" indent="0">
+              <a:buNone/>
+            </a:pPr>
+            <a:r>
+              <a:rPr lang="en-US" dirty="0"/>
+              <a:t>(add screenshot?)</a:t>
+            </a:r>
           </a:p>
         </p:txBody>
       </p:sp>
     </p:spTree>
     <p:extLst>
       <p:ext uri="{BB962C8B-B14F-4D97-AF65-F5344CB8AC3E}">
-        <p14:creationId xmlns:p14="http://schemas.microsoft.com/office/powerpoint/2010/main" val="3672589953"/>
+        <p14:creationId xmlns:p14="http://schemas.microsoft.com/office/powerpoint/2010/main" val="1236791624"/>
       </p:ext>
     </p:extLst>
   </p:cSld>
@@ -14031,7 +14212,7 @@
           <p:cNvPr id="2" name="Title 1">
             <a:extLst>
               <a:ext uri="{FF2B5EF4-FFF2-40B4-BE49-F238E27FC236}">
-                <a16:creationId xmlns:a16="http://schemas.microsoft.com/office/drawing/2014/main" id="{FF69FBDC-5D1D-EC41-9457-7190B12922F3}"/>
+                <a16:creationId xmlns:a16="http://schemas.microsoft.com/office/drawing/2014/main" id="{4678F475-44F1-B44C-991B-618B9787BF1F}"/>
               </a:ext>
             </a:extLst>
           </p:cNvPr>
@@ -14047,10 +14228,7 @@
           <a:bodyPr/>
           <a:lstStyle/>
           <a:p>
-            <a:r>
-              <a:rPr lang="en-US" dirty="0"/>
-              <a:t>Final visualizations</a:t>
-            </a:r>
+            <a:endParaRPr lang="en-US" dirty="0"/>
           </a:p>
         </p:txBody>
       </p:sp>
@@ -14059,7 +14237,7 @@
           <p:cNvPr id="3" name="Content Placeholder 2">
             <a:extLst>
               <a:ext uri="{FF2B5EF4-FFF2-40B4-BE49-F238E27FC236}">
-                <a16:creationId xmlns:a16="http://schemas.microsoft.com/office/drawing/2014/main" id="{72D49549-0F94-204B-B5A0-AB023AA978A1}"/>
+                <a16:creationId xmlns:a16="http://schemas.microsoft.com/office/drawing/2014/main" id="{A2052F9C-93F4-7244-8BAE-3FC5931967D0}"/>
               </a:ext>
             </a:extLst>
           </p:cNvPr>
@@ -14082,7 +14260,7 @@
     </p:spTree>
     <p:extLst>
       <p:ext uri="{BB962C8B-B14F-4D97-AF65-F5344CB8AC3E}">
-        <p14:creationId xmlns:p14="http://schemas.microsoft.com/office/powerpoint/2010/main" val="1236791624"/>
+        <p14:creationId xmlns:p14="http://schemas.microsoft.com/office/powerpoint/2010/main" val="3113837784"/>
       </p:ext>
     </p:extLst>
   </p:cSld>

</xml_diff>